<commit_message>
Lecture 08 done - missing IAsyncEnumerable to be added
</commit_message>
<xml_diff>
--- a/Slides/Lecture08 - Asynchronous and Parallel Programming in CSharp.pptx
+++ b/Slides/Lecture08 - Asynchronous and Parallel Programming in CSharp.pptx
@@ -6,10 +6,10 @@
     <p:sldMasterId id="2147484675" r:id="rId5"/>
   </p:sldMasterIdLst>
   <p:notesMasterIdLst>
-    <p:notesMasterId r:id="rId29"/>
+    <p:notesMasterId r:id="rId30"/>
   </p:notesMasterIdLst>
   <p:handoutMasterIdLst>
-    <p:handoutMasterId r:id="rId30"/>
+    <p:handoutMasterId r:id="rId31"/>
   </p:handoutMasterIdLst>
   <p:sldIdLst>
     <p:sldId id="1663" r:id="rId6"/>
@@ -31,10 +31,11 @@
     <p:sldId id="1686" r:id="rId22"/>
     <p:sldId id="1692" r:id="rId23"/>
     <p:sldId id="1667" r:id="rId24"/>
-    <p:sldId id="1693" r:id="rId25"/>
-    <p:sldId id="1668" r:id="rId26"/>
-    <p:sldId id="1694" r:id="rId27"/>
-    <p:sldId id="1671" r:id="rId28"/>
+    <p:sldId id="1698" r:id="rId25"/>
+    <p:sldId id="1693" r:id="rId26"/>
+    <p:sldId id="1668" r:id="rId27"/>
+    <p:sldId id="1694" r:id="rId28"/>
+    <p:sldId id="1671" r:id="rId29"/>
   </p:sldIdLst>
   <p:sldSz cx="12192000" cy="6858000"/>
   <p:notesSz cx="6858000" cy="9144000"/>
@@ -157,6 +158,7 @@
             <p14:sldId id="1686"/>
             <p14:sldId id="1692"/>
             <p14:sldId id="1667"/>
+            <p14:sldId id="1698"/>
             <p14:sldId id="1693"/>
             <p14:sldId id="1668"/>
             <p14:sldId id="1694"/>
@@ -300,7 +302,7 @@
               <a:rPr lang="en-US" smtClean="0">
                 <a:latin typeface="Segoe UI" pitchFamily="34" charset="0"/>
               </a:rPr>
-              <a:t>11/1/2019 9:22 AM</a:t>
+              <a:t>11/1/2019 11:46 AM</a:t>
             </a:fld>
             <a:endParaRPr lang="en-US" dirty="0">
               <a:latin typeface="Segoe UI" pitchFamily="34" charset="0"/>
@@ -578,7 +580,7 @@
           <a:p>
             <a:fld id="{386CE63F-9E7F-4C04-9D0D-FCA25A8E9E86}" type="datetime8">
               <a:rPr lang="en-US" smtClean="0"/>
-              <a:t>11/1/2019 9:22 AM</a:t>
+              <a:t>11/1/2019 10:01 AM</a:t>
             </a:fld>
             <a:endParaRPr lang="en-US" dirty="0"/>
           </a:p>
@@ -945,7 +947,7 @@
           <a:p>
             <a:fld id="{321E5A7B-BB8D-4368-A182-109669521632}" type="datetime8">
               <a:rPr lang="en-US" smtClean="0"/>
-              <a:t>11/1/2019 9:22 AM</a:t>
+              <a:t>11/1/2019 10:01 AM</a:t>
             </a:fld>
             <a:endParaRPr lang="en-US" dirty="0"/>
           </a:p>
@@ -20829,10 +20831,10 @@
       </p:grpSpPr>
       <p:sp>
         <p:nvSpPr>
-          <p:cNvPr id="2" name="Title 1">
+          <p:cNvPr id="5" name="Title 4">
             <a:extLst>
               <a:ext uri="{FF2B5EF4-FFF2-40B4-BE49-F238E27FC236}">
-                <a16:creationId xmlns:a16="http://schemas.microsoft.com/office/drawing/2014/main" id="{EE0CA37D-D5AB-4BAA-980A-8DFAB5BC83DD}"/>
+                <a16:creationId xmlns:a16="http://schemas.microsoft.com/office/drawing/2014/main" id="{5C11A39F-5003-4683-A478-A370734D8F87}"/>
               </a:ext>
             </a:extLst>
           </p:cNvPr>
@@ -20843,12 +20845,7 @@
             <p:ph type="title"/>
           </p:nvPr>
         </p:nvSpPr>
-        <p:spPr>
-          <a:xfrm>
-            <a:off x="588263" y="457200"/>
-            <a:ext cx="11018520" cy="553998"/>
-          </a:xfrm>
-        </p:spPr>
+        <p:spPr/>
         <p:txBody>
           <a:bodyPr/>
           <a:lstStyle/>
@@ -20857,70 +20854,32 @@
               <a:rPr lang="da-DK" dirty="0"/>
               <a:t>Asynchronous Programming</a:t>
             </a:r>
-          </a:p>
-        </p:txBody>
-      </p:sp>
-      <p:sp>
-        <p:nvSpPr>
-          <p:cNvPr id="3" name="Text Placeholder 2">
-            <a:extLst>
-              <a:ext uri="{FF2B5EF4-FFF2-40B4-BE49-F238E27FC236}">
-                <a16:creationId xmlns:a16="http://schemas.microsoft.com/office/drawing/2014/main" id="{4C644CC5-42D4-4BB7-B393-CAE1F9B4D6BB}"/>
-              </a:ext>
-            </a:extLst>
-          </p:cNvPr>
-          <p:cNvSpPr>
-            <a:spLocks noGrp="1"/>
-          </p:cNvSpPr>
-          <p:nvPr>
-            <p:ph type="body" sz="quarter" idx="10"/>
-          </p:nvPr>
-        </p:nvSpPr>
-        <p:spPr>
-          <a:xfrm>
-            <a:off x="586390" y="1434370"/>
-            <a:ext cx="11018520" cy="2769989"/>
-          </a:xfrm>
-        </p:spPr>
-        <p:txBody>
-          <a:bodyPr/>
-          <a:lstStyle/>
-          <a:p>
-            <a:r>
-              <a:rPr lang="en-US" sz="3600" b="1" dirty="0"/>
-              <a:t>Asynchronous programming</a:t>
-            </a:r>
-            <a:r>
-              <a:rPr lang="en-US" sz="3600" dirty="0"/>
-              <a:t> is a means of parallel </a:t>
-            </a:r>
-            <a:r>
-              <a:rPr lang="en-US" sz="3600" b="1" dirty="0"/>
-              <a:t>programming</a:t>
-            </a:r>
-            <a:r>
-              <a:rPr lang="en-US" sz="3600" dirty="0"/>
-              <a:t> in which a unit of work runs separately from the main application thread and notifies the calling thread of its completion, failure or progress.</a:t>
-            </a:r>
-            <a:endParaRPr lang="en-US" sz="4000" dirty="0">
-              <a:latin typeface="Consolas" panose="020B0609020204030204" pitchFamily="49" charset="0"/>
-            </a:endParaRPr>
+            <a:endParaRPr lang="en-US" dirty="0"/>
           </a:p>
         </p:txBody>
       </p:sp>
     </p:spTree>
     <p:extLst>
       <p:ext uri="{BB962C8B-B14F-4D97-AF65-F5344CB8AC3E}">
-        <p14:creationId xmlns:p14="http://schemas.microsoft.com/office/powerpoint/2010/main" val="799442558"/>
+        <p14:creationId xmlns:p14="http://schemas.microsoft.com/office/powerpoint/2010/main" val="3486719492"/>
       </p:ext>
     </p:extLst>
   </p:cSld>
   <p:clrMapOvr>
     <a:masterClrMapping/>
   </p:clrMapOvr>
-  <p:transition>
-    <p:fade/>
-  </p:transition>
+  <mc:AlternateContent xmlns:mc="http://schemas.openxmlformats.org/markup-compatibility/2006" xmlns:p14="http://schemas.microsoft.com/office/powerpoint/2010/main">
+    <mc:Choice Requires="p14">
+      <p:transition spd="med" p14:dur="700">
+        <p:fade/>
+      </p:transition>
+    </mc:Choice>
+    <mc:Fallback xmlns="">
+      <p:transition spd="med">
+        <p:fade/>
+      </p:transition>
+    </mc:Fallback>
+  </mc:AlternateContent>
 </p:sld>
 </file>
 
@@ -20969,6 +20928,120 @@
           <a:p>
             <a:r>
               <a:rPr lang="da-DK" dirty="0"/>
+              <a:t>Asynchronous Programming</a:t>
+            </a:r>
+          </a:p>
+        </p:txBody>
+      </p:sp>
+      <p:sp>
+        <p:nvSpPr>
+          <p:cNvPr id="3" name="Text Placeholder 2">
+            <a:extLst>
+              <a:ext uri="{FF2B5EF4-FFF2-40B4-BE49-F238E27FC236}">
+                <a16:creationId xmlns:a16="http://schemas.microsoft.com/office/drawing/2014/main" id="{4C644CC5-42D4-4BB7-B393-CAE1F9B4D6BB}"/>
+              </a:ext>
+            </a:extLst>
+          </p:cNvPr>
+          <p:cNvSpPr>
+            <a:spLocks noGrp="1"/>
+          </p:cNvSpPr>
+          <p:nvPr>
+            <p:ph type="body" sz="quarter" idx="10"/>
+          </p:nvPr>
+        </p:nvSpPr>
+        <p:spPr>
+          <a:xfrm>
+            <a:off x="586390" y="1434370"/>
+            <a:ext cx="11018520" cy="2769989"/>
+          </a:xfrm>
+        </p:spPr>
+        <p:txBody>
+          <a:bodyPr/>
+          <a:lstStyle/>
+          <a:p>
+            <a:r>
+              <a:rPr lang="en-US" sz="3600" b="1" dirty="0"/>
+              <a:t>Asynchronous programming</a:t>
+            </a:r>
+            <a:r>
+              <a:rPr lang="en-US" sz="3600" dirty="0"/>
+              <a:t> is a means of parallel </a:t>
+            </a:r>
+            <a:r>
+              <a:rPr lang="en-US" sz="3600" b="1" dirty="0"/>
+              <a:t>programming</a:t>
+            </a:r>
+            <a:r>
+              <a:rPr lang="en-US" sz="3600" dirty="0"/>
+              <a:t> in which a unit of work runs separately from the main application thread and notifies the calling thread of its completion, failure or progress.</a:t>
+            </a:r>
+            <a:endParaRPr lang="en-US" sz="4000" dirty="0">
+              <a:latin typeface="Consolas" panose="020B0609020204030204" pitchFamily="49" charset="0"/>
+            </a:endParaRPr>
+          </a:p>
+        </p:txBody>
+      </p:sp>
+    </p:spTree>
+    <p:extLst>
+      <p:ext uri="{BB962C8B-B14F-4D97-AF65-F5344CB8AC3E}">
+        <p14:creationId xmlns:p14="http://schemas.microsoft.com/office/powerpoint/2010/main" val="799442558"/>
+      </p:ext>
+    </p:extLst>
+  </p:cSld>
+  <p:clrMapOvr>
+    <a:masterClrMapping/>
+  </p:clrMapOvr>
+  <p:transition>
+    <p:fade/>
+  </p:transition>
+</p:sld>
+</file>
+
+<file path=ppt/slides/slide22.xml><?xml version="1.0" encoding="utf-8"?>
+<p:sld xmlns:a="http://schemas.openxmlformats.org/drawingml/2006/main" xmlns:r="http://schemas.openxmlformats.org/officeDocument/2006/relationships" xmlns:p="http://schemas.openxmlformats.org/presentationml/2006/main">
+  <p:cSld>
+    <p:spTree>
+      <p:nvGrpSpPr>
+        <p:cNvPr id="1" name=""/>
+        <p:cNvGrpSpPr/>
+        <p:nvPr/>
+      </p:nvGrpSpPr>
+      <p:grpSpPr>
+        <a:xfrm>
+          <a:off x="0" y="0"/>
+          <a:ext cx="0" cy="0"/>
+          <a:chOff x="0" y="0"/>
+          <a:chExt cx="0" cy="0"/>
+        </a:xfrm>
+      </p:grpSpPr>
+      <p:sp>
+        <p:nvSpPr>
+          <p:cNvPr id="2" name="Title 1">
+            <a:extLst>
+              <a:ext uri="{FF2B5EF4-FFF2-40B4-BE49-F238E27FC236}">
+                <a16:creationId xmlns:a16="http://schemas.microsoft.com/office/drawing/2014/main" id="{EE0CA37D-D5AB-4BAA-980A-8DFAB5BC83DD}"/>
+              </a:ext>
+            </a:extLst>
+          </p:cNvPr>
+          <p:cNvSpPr>
+            <a:spLocks noGrp="1"/>
+          </p:cNvSpPr>
+          <p:nvPr>
+            <p:ph type="title"/>
+          </p:nvPr>
+        </p:nvSpPr>
+        <p:spPr>
+          <a:xfrm>
+            <a:off x="588263" y="457200"/>
+            <a:ext cx="11018520" cy="553998"/>
+          </a:xfrm>
+        </p:spPr>
+        <p:txBody>
+          <a:bodyPr/>
+          <a:lstStyle/>
+          <a:p>
+            <a:r>
+              <a:rPr lang="da-DK" dirty="0"/>
               <a:t>async/await</a:t>
             </a:r>
           </a:p>
@@ -21196,7 +21269,7 @@
 </p:sld>
 </file>
 
-<file path=ppt/slides/slide22.xml><?xml version="1.0" encoding="utf-8"?>
+<file path=ppt/slides/slide23.xml><?xml version="1.0" encoding="utf-8"?>
 <p:sld xmlns:a="http://schemas.openxmlformats.org/drawingml/2006/main" xmlns:r="http://schemas.openxmlformats.org/officeDocument/2006/relationships" xmlns:p="http://schemas.openxmlformats.org/presentationml/2006/main">
   <p:cSld>
     <p:spTree>
@@ -21301,7 +21374,7 @@
 </p:sld>
 </file>
 
-<file path=ppt/slides/slide23.xml><?xml version="1.0" encoding="utf-8"?>
+<file path=ppt/slides/slide24.xml><?xml version="1.0" encoding="utf-8"?>
 <p:sld xmlns:a="http://schemas.openxmlformats.org/drawingml/2006/main" xmlns:r="http://schemas.openxmlformats.org/officeDocument/2006/relationships" xmlns:p="http://schemas.openxmlformats.org/presentationml/2006/main">
   <p:cSld>
     <p:spTree>
@@ -22550,7 +22623,7 @@
           <a:p>
             <a:r>
               <a:rPr lang="da-DK" dirty="0"/>
-              <a:t>Multithreading</a:t>
+              <a:t>Concurrency</a:t>
             </a:r>
             <a:endParaRPr lang="LID4096" dirty="0"/>
           </a:p>
@@ -22566,13 +22639,13 @@
   <p:clrMapOvr>
     <a:masterClrMapping/>
   </p:clrMapOvr>
-  <mc:AlternateContent xmlns:mc="http://schemas.openxmlformats.org/markup-compatibility/2006">
-    <mc:Choice xmlns:p14="http://schemas.microsoft.com/office/powerpoint/2010/main" Requires="p14">
+  <mc:AlternateContent xmlns:mc="http://schemas.openxmlformats.org/markup-compatibility/2006" xmlns:p14="http://schemas.microsoft.com/office/powerpoint/2010/main">
+    <mc:Choice Requires="p14">
       <p:transition spd="med" p14:dur="700">
         <p:fade/>
       </p:transition>
     </mc:Choice>
-    <mc:Fallback>
+    <mc:Fallback xmlns="">
       <p:transition spd="med">
         <p:fade/>
       </p:transition>
@@ -22806,7 +22879,7 @@
           <a:p>
             <a:r>
               <a:rPr lang="en-US" dirty="0"/>
-              <a:t>Concurrency</a:t>
+              <a:t>Threads</a:t>
             </a:r>
             <a:endParaRPr lang="LID4096" dirty="0"/>
           </a:p>
@@ -22822,13 +22895,13 @@
   <p:clrMapOvr>
     <a:masterClrMapping/>
   </p:clrMapOvr>
-  <mc:AlternateContent xmlns:mc="http://schemas.openxmlformats.org/markup-compatibility/2006">
-    <mc:Choice xmlns:p14="http://schemas.microsoft.com/office/powerpoint/2010/main" Requires="p14">
+  <mc:AlternateContent xmlns:mc="http://schemas.openxmlformats.org/markup-compatibility/2006" xmlns:p14="http://schemas.microsoft.com/office/powerpoint/2010/main">
+    <mc:Choice Requires="p14">
       <p:transition spd="med" p14:dur="700">
         <p:fade/>
       </p:transition>
     </mc:Choice>
-    <mc:Fallback>
+    <mc:Fallback xmlns="">
       <p:transition spd="med">
         <p:fade/>
       </p:transition>
@@ -25276,20 +25349,20 @@
 </file>
 
 <file path=customXml/item1.xml><?xml version="1.0" encoding="utf-8"?>
+<p:properties xmlns:p="http://schemas.microsoft.com/office/2006/metadata/properties" xmlns:xsi="http://www.w3.org/2001/XMLSchema-instance" xmlns:pc="http://schemas.microsoft.com/office/infopath/2007/PartnerControls">
+  <documentManagement>
+    <MediaServiceKeyPoints xmlns="965de625-df5b-42e9-a277-2113da4f1195" xsi:nil="true"/>
+  </documentManagement>
+</p:properties>
+</file>
+
+<file path=customXml/item2.xml><?xml version="1.0" encoding="utf-8"?>
 <?mso-contentType ?>
 <FormTemplates xmlns="http://schemas.microsoft.com/sharepoint/v3/contenttype/forms">
   <Display>DocumentLibraryForm</Display>
   <Edit>DocumentLibraryForm</Edit>
   <New>DocumentLibraryForm</New>
 </FormTemplates>
-</file>
-
-<file path=customXml/item2.xml><?xml version="1.0" encoding="utf-8"?>
-<p:properties xmlns:p="http://schemas.microsoft.com/office/2006/metadata/properties" xmlns:xsi="http://www.w3.org/2001/XMLSchema-instance" xmlns:pc="http://schemas.microsoft.com/office/infopath/2007/PartnerControls">
-  <documentManagement>
-    <MediaServiceKeyPoints xmlns="965de625-df5b-42e9-a277-2113da4f1195" xsi:nil="true"/>
-  </documentManagement>
-</p:properties>
 </file>
 
 <file path=customXml/item3.xml><?xml version="1.0" encoding="utf-8"?>
@@ -25524,14 +25597,6 @@
 </file>
 
 <file path=customXml/itemProps1.xml><?xml version="1.0" encoding="utf-8"?>
-<ds:datastoreItem xmlns:ds="http://schemas.openxmlformats.org/officeDocument/2006/customXml" ds:itemID="{758FDAC0-319D-4A54-8D8E-1D42CB1F8004}">
-  <ds:schemaRefs>
-    <ds:schemaRef ds:uri="http://schemas.microsoft.com/sharepoint/v3/contenttype/forms"/>
-  </ds:schemaRefs>
-</ds:datastoreItem>
-</file>
-
-<file path=customXml/itemProps2.xml><?xml version="1.0" encoding="utf-8"?>
 <ds:datastoreItem xmlns:ds="http://schemas.openxmlformats.org/officeDocument/2006/customXml" ds:itemID="{F990F116-B58F-4255-B05B-DA3808E0E5C6}">
   <ds:schemaRefs>
     <ds:schemaRef ds:uri="http://purl.org/dc/elements/1.1/"/>
@@ -25546,6 +25611,14 @@
     <ds:schemaRef ds:uri="http://www.w3.org/XML/1998/namespace"/>
     <ds:schemaRef ds:uri="http://purl.org/dc/terms/"/>
     <ds:schemaRef ds:uri="965de625-df5b-42e9-a277-2113da4f1195"/>
+  </ds:schemaRefs>
+</ds:datastoreItem>
+</file>
+
+<file path=customXml/itemProps2.xml><?xml version="1.0" encoding="utf-8"?>
+<ds:datastoreItem xmlns:ds="http://schemas.openxmlformats.org/officeDocument/2006/customXml" ds:itemID="{758FDAC0-319D-4A54-8D8E-1D42CB1F8004}">
+  <ds:schemaRefs>
+    <ds:schemaRef ds:uri="http://schemas.microsoft.com/sharepoint/v3/contenttype/forms"/>
   </ds:schemaRefs>
 </ds:datastoreItem>
 </file>

</xml_diff>